<commit_message>
shadow mapping prez 2
</commit_message>
<xml_diff>
--- a/GFX_EA_02.pptx
+++ b/GFX_EA_02.pptx
@@ -5,7 +5,7 @@
     <p:sldMasterId id="2147483767" r:id="rId1"/>
   </p:sldMasterIdLst>
   <p:notesMasterIdLst>
-    <p:notesMasterId r:id="rId7"/>
+    <p:notesMasterId r:id="rId12"/>
   </p:notesMasterIdLst>
   <p:sldIdLst>
     <p:sldId id="256" r:id="rId2"/>
@@ -13,6 +13,11 @@
     <p:sldId id="258" r:id="rId4"/>
     <p:sldId id="259" r:id="rId5"/>
     <p:sldId id="260" r:id="rId6"/>
+    <p:sldId id="261" r:id="rId7"/>
+    <p:sldId id="262" r:id="rId8"/>
+    <p:sldId id="263" r:id="rId9"/>
+    <p:sldId id="264" r:id="rId10"/>
+    <p:sldId id="265" r:id="rId11"/>
   </p:sldIdLst>
   <p:sldSz cx="12192000" cy="6858000"/>
   <p:notesSz cx="7104063" cy="10234613"/>
@@ -4277,6 +4282,98 @@
 </p:sld>
 </file>
 
+<file path=ppt/slides/slide10.xml><?xml version="1.0" encoding="utf-8"?>
+<p:sld xmlns:a="http://schemas.openxmlformats.org/drawingml/2006/main" xmlns:r="http://schemas.openxmlformats.org/officeDocument/2006/relationships" xmlns:p="http://schemas.openxmlformats.org/presentationml/2006/main">
+  <p:cSld>
+    <p:spTree>
+      <p:nvGrpSpPr>
+        <p:cNvPr id="1" name=""/>
+        <p:cNvGrpSpPr/>
+        <p:nvPr/>
+      </p:nvGrpSpPr>
+      <p:grpSpPr>
+        <a:xfrm>
+          <a:off x="0" y="0"/>
+          <a:ext cx="0" cy="0"/>
+          <a:chOff x="0" y="0"/>
+          <a:chExt cx="0" cy="0"/>
+        </a:xfrm>
+      </p:grpSpPr>
+      <p:sp>
+        <p:nvSpPr>
+          <p:cNvPr id="2" name="Title 1">
+            <a:extLst>
+              <a:ext uri="{FF2B5EF4-FFF2-40B4-BE49-F238E27FC236}">
+                <a16:creationId xmlns:a16="http://schemas.microsoft.com/office/drawing/2014/main" id="{8EBAEA31-B4E1-4148-B89E-605DE60F6D6C}"/>
+              </a:ext>
+            </a:extLst>
+          </p:cNvPr>
+          <p:cNvSpPr>
+            <a:spLocks noGrp="1"/>
+          </p:cNvSpPr>
+          <p:nvPr>
+            <p:ph type="title"/>
+          </p:nvPr>
+        </p:nvSpPr>
+        <p:spPr/>
+        <p:txBody>
+          <a:bodyPr/>
+          <a:lstStyle/>
+          <a:p>
+            <a:r>
+              <a:rPr lang="en-US" dirty="0"/>
+              <a:t>Irregular PCF (</a:t>
+            </a:r>
+            <a:r>
+              <a:rPr lang="en-US" dirty="0" err="1"/>
+              <a:t>Crysis</a:t>
+            </a:r>
+            <a:r>
+              <a:rPr lang="en-US" dirty="0"/>
+              <a:t>)</a:t>
+            </a:r>
+            <a:endParaRPr lang="hu-HU" dirty="0"/>
+          </a:p>
+        </p:txBody>
+      </p:sp>
+      <p:sp>
+        <p:nvSpPr>
+          <p:cNvPr id="3" name="Content Placeholder 2">
+            <a:extLst>
+              <a:ext uri="{FF2B5EF4-FFF2-40B4-BE49-F238E27FC236}">
+                <a16:creationId xmlns:a16="http://schemas.microsoft.com/office/drawing/2014/main" id="{1E2C2CF6-72BA-4E89-B464-E85EBB990DE9}"/>
+              </a:ext>
+            </a:extLst>
+          </p:cNvPr>
+          <p:cNvSpPr>
+            <a:spLocks noGrp="1"/>
+          </p:cNvSpPr>
+          <p:nvPr>
+            <p:ph idx="1"/>
+          </p:nvPr>
+        </p:nvSpPr>
+        <p:spPr/>
+        <p:txBody>
+          <a:bodyPr/>
+          <a:lstStyle/>
+          <a:p>
+            <a:endParaRPr lang="hu-HU" dirty="0"/>
+          </a:p>
+        </p:txBody>
+      </p:sp>
+    </p:spTree>
+    <p:extLst>
+      <p:ext uri="{BB962C8B-B14F-4D97-AF65-F5344CB8AC3E}">
+        <p14:creationId xmlns:p14="http://schemas.microsoft.com/office/powerpoint/2010/main" val="1154412282"/>
+      </p:ext>
+    </p:extLst>
+  </p:cSld>
+  <p:clrMapOvr>
+    <a:masterClrMapping/>
+  </p:clrMapOvr>
+</p:sld>
+</file>
+
 <file path=ppt/slides/slide2.xml><?xml version="1.0" encoding="utf-8"?>
 <p:sld xmlns:a="http://schemas.openxmlformats.org/drawingml/2006/main" xmlns:r="http://schemas.openxmlformats.org/officeDocument/2006/relationships" xmlns:p="http://schemas.openxmlformats.org/presentationml/2006/main">
   <p:cSld>
@@ -5147,10 +5244,6 @@
             <a:r>
               <a:rPr lang="en-US" dirty="0" err="1"/>
               <a:t>árnyék</a:t>
-            </a:r>
-            <a:r>
-              <a:rPr lang="en-US" dirty="0"/>
-              <a:t> (shadow map)</a:t>
             </a:r>
             <a:endParaRPr lang="hu-HU" dirty="0"/>
           </a:p>
@@ -5790,7 +5883,7 @@
                 </a:r>
                 <a:r>
                   <a:rPr lang="en-US" i="1" dirty="0"/>
-                  <a:t>clip space</a:t>
+                  <a:t>screen space</a:t>
                 </a:r>
                 <a:r>
                   <a:rPr lang="en-US" dirty="0"/>
@@ -5892,9 +5985,36 @@
                 </a:r>
                 <a:r>
                   <a:rPr lang="en-US" dirty="0" err="1"/>
-                  <a:t>érték</a:t>
-                </a:r>
-                <a:endParaRPr lang="en-US" dirty="0"/>
+                  <a:t>mélységérték</a:t>
+                </a:r>
+                <a:r>
+                  <a:rPr lang="en-US" dirty="0"/>
+                  <a:t> (</a:t>
+                </a:r>
+                <a:r>
+                  <a:rPr lang="en-US" dirty="0" err="1"/>
+                  <a:t>szintén</a:t>
+                </a:r>
+                <a:r>
+                  <a:rPr lang="en-US" dirty="0"/>
+                  <a:t> a </a:t>
+                </a:r>
+                <a:r>
+                  <a:rPr lang="en-US" dirty="0" err="1"/>
+                  <a:t>fény</a:t>
+                </a:r>
+                <a:r>
+                  <a:rPr lang="en-US" dirty="0"/>
+                  <a:t> </a:t>
+                </a:r>
+                <a:r>
+                  <a:rPr lang="en-US" dirty="0" err="1"/>
+                  <a:t>terében</a:t>
+                </a:r>
+                <a:r>
+                  <a:rPr lang="en-US" dirty="0"/>
+                  <a:t>!)</a:t>
+                </a:r>
               </a:p>
               <a:p>
                 <a:pPr lvl="1">
@@ -6408,7 +6528,788 @@
           <a:bodyPr/>
           <a:lstStyle/>
           <a:p>
-            <a:endParaRPr lang="hu-HU"/>
+            <a:r>
+              <a:rPr lang="en-US" dirty="0" err="1"/>
+              <a:t>Emlékeztető</a:t>
+            </a:r>
+            <a:r>
+              <a:rPr lang="en-US" dirty="0"/>
+              <a:t>: </a:t>
+            </a:r>
+            <a:r>
+              <a:rPr lang="en-US" dirty="0" err="1"/>
+              <a:t>projektív</a:t>
+            </a:r>
+            <a:r>
+              <a:rPr lang="en-US" dirty="0"/>
+              <a:t> </a:t>
+            </a:r>
+            <a:r>
+              <a:rPr lang="en-US" dirty="0" err="1"/>
+              <a:t>textúrázás</a:t>
+            </a:r>
+            <a:endParaRPr lang="hu-HU" dirty="0"/>
+          </a:p>
+        </p:txBody>
+      </p:sp>
+      <mc:AlternateContent xmlns:mc="http://schemas.openxmlformats.org/markup-compatibility/2006">
+        <mc:Choice xmlns:a14="http://schemas.microsoft.com/office/drawing/2010/main" Requires="a14">
+          <p:sp>
+            <p:nvSpPr>
+              <p:cNvPr id="3" name="Content Placeholder 2">
+                <a:extLst>
+                  <a:ext uri="{FF2B5EF4-FFF2-40B4-BE49-F238E27FC236}">
+                    <a16:creationId xmlns:a16="http://schemas.microsoft.com/office/drawing/2014/main" id="{B577BDB9-109F-41E3-B8D6-A211AF73A294}"/>
+                  </a:ext>
+                </a:extLst>
+              </p:cNvPr>
+              <p:cNvSpPr>
+                <a:spLocks noGrp="1"/>
+              </p:cNvSpPr>
+              <p:nvPr>
+                <p:ph idx="1"/>
+              </p:nvPr>
+            </p:nvSpPr>
+            <p:spPr/>
+            <p:txBody>
+              <a:bodyPr/>
+              <a:lstStyle/>
+              <a:p>
+                <a:pPr>
+                  <a:buFont typeface="Wingdings" panose="05000000000000000000" pitchFamily="2" charset="2"/>
+                  <a:buChar char="§"/>
+                </a:pPr>
+                <a:r>
+                  <a:rPr lang="en-US" dirty="0"/>
+                  <a:t>A </a:t>
+                </a:r>
+                <a:r>
+                  <a:rPr lang="en-US" dirty="0" err="1"/>
+                  <a:t>pozíció</a:t>
+                </a:r>
+                <a:r>
+                  <a:rPr lang="en-US" dirty="0"/>
+                  <a:t> </a:t>
+                </a:r>
+                <a:r>
+                  <a:rPr lang="en-US" dirty="0" err="1"/>
+                  <a:t>beszorozva</a:t>
+                </a:r>
+                <a:r>
+                  <a:rPr lang="en-US" dirty="0"/>
+                  <a:t> a </a:t>
+                </a:r>
+                <a:r>
+                  <a:rPr lang="en-US" dirty="0" err="1"/>
+                  <a:t>projekciós</a:t>
+                </a:r>
+                <a:r>
+                  <a:rPr lang="en-US" dirty="0"/>
+                  <a:t> </a:t>
+                </a:r>
+                <a:r>
+                  <a:rPr lang="en-US" dirty="0" err="1"/>
+                  <a:t>mátrixxal</a:t>
+                </a:r>
+                <a:r>
+                  <a:rPr lang="en-US" dirty="0"/>
+                  <a:t>: </a:t>
+                </a:r>
+                <a:r>
+                  <a:rPr lang="en-US" i="1" dirty="0"/>
+                  <a:t>device coordinates</a:t>
+                </a:r>
+                <a:r>
+                  <a:rPr lang="en-US" dirty="0"/>
+                  <a:t> (</a:t>
+                </a:r>
+                <a:r>
+                  <a:rPr lang="en-US" i="1" dirty="0"/>
+                  <a:t>DC</a:t>
+                </a:r>
+                <a:r>
+                  <a:rPr lang="en-US" dirty="0"/>
+                  <a:t>)</a:t>
+                </a:r>
+              </a:p>
+              <a:p>
+                <a:pPr>
+                  <a:buFont typeface="Wingdings" panose="05000000000000000000" pitchFamily="2" charset="2"/>
+                  <a:buChar char="§"/>
+                </a:pPr>
+                <a:r>
+                  <a:rPr lang="en-US" i="1" dirty="0"/>
+                  <a:t>Perspective division</a:t>
+                </a:r>
+                <a:r>
+                  <a:rPr lang="en-US" dirty="0"/>
+                  <a:t> </a:t>
+                </a:r>
+                <a:r>
+                  <a:rPr lang="en-US" dirty="0" err="1"/>
+                  <a:t>után</a:t>
+                </a:r>
+                <a:r>
+                  <a:rPr lang="en-US" dirty="0"/>
+                  <a:t>: </a:t>
+                </a:r>
+                <a:r>
+                  <a:rPr lang="en-US" i="1" dirty="0"/>
+                  <a:t>normalized device coordinates</a:t>
+                </a:r>
+                <a:r>
+                  <a:rPr lang="en-US" dirty="0"/>
+                  <a:t> (</a:t>
+                </a:r>
+                <a:r>
+                  <a:rPr lang="en-US" i="1" dirty="0"/>
+                  <a:t>NDC</a:t>
+                </a:r>
+                <a:r>
+                  <a:rPr lang="en-US" dirty="0"/>
+                  <a:t>) </a:t>
+                </a:r>
+                <a14:m>
+                  <m:oMath xmlns:m="http://schemas.openxmlformats.org/officeDocument/2006/math">
+                    <m:r>
+                      <a:rPr lang="en-US" b="0" i="1" smtClean="0">
+                        <a:latin typeface="Cambria Math" panose="02040503050406030204" pitchFamily="18" charset="0"/>
+                      </a:rPr>
+                      <m:t>∈</m:t>
+                    </m:r>
+                    <m:sSup>
+                      <m:sSupPr>
+                        <m:ctrlPr>
+                          <a:rPr lang="en-US" b="0" i="1" smtClean="0">
+                            <a:latin typeface="Cambria Math" panose="02040503050406030204" pitchFamily="18" charset="0"/>
+                          </a:rPr>
+                        </m:ctrlPr>
+                      </m:sSupPr>
+                      <m:e>
+                        <m:r>
+                          <a:rPr lang="en-US" b="0" i="1" smtClean="0">
+                            <a:latin typeface="Cambria Math" panose="02040503050406030204" pitchFamily="18" charset="0"/>
+                          </a:rPr>
+                          <m:t>[−1, 1]</m:t>
+                        </m:r>
+                      </m:e>
+                      <m:sup>
+                        <m:r>
+                          <a:rPr lang="en-US" b="0" i="1" smtClean="0">
+                            <a:latin typeface="Cambria Math" panose="02040503050406030204" pitchFamily="18" charset="0"/>
+                          </a:rPr>
+                          <m:t>3</m:t>
+                        </m:r>
+                      </m:sup>
+                    </m:sSup>
+                  </m:oMath>
+                </a14:m>
+                <a:endParaRPr lang="en-US" dirty="0"/>
+              </a:p>
+              <a:p>
+                <a:pPr>
+                  <a:buFont typeface="Wingdings" panose="05000000000000000000" pitchFamily="2" charset="2"/>
+                  <a:buChar char="§"/>
+                </a:pPr>
+                <a:r>
+                  <a:rPr lang="en-US" dirty="0" err="1"/>
+                  <a:t>Ennek</a:t>
+                </a:r>
+                <a:r>
+                  <a:rPr lang="en-US" dirty="0"/>
+                  <a:t> </a:t>
+                </a:r>
+                <a:r>
+                  <a:rPr lang="en-US" dirty="0" err="1"/>
+                  <a:t>az</a:t>
+                </a:r>
+                <a:r>
+                  <a:rPr lang="en-US" dirty="0"/>
+                  <a:t> </a:t>
+                </a:r>
+                <a:r>
+                  <a:rPr lang="en-US" dirty="0" err="1"/>
+                  <a:t>első</a:t>
+                </a:r>
+                <a:r>
+                  <a:rPr lang="en-US" dirty="0"/>
+                  <a:t> </a:t>
+                </a:r>
+                <a:r>
+                  <a:rPr lang="en-US" dirty="0" err="1"/>
+                  <a:t>két</a:t>
+                </a:r>
+                <a:r>
+                  <a:rPr lang="en-US" dirty="0"/>
+                  <a:t> </a:t>
+                </a:r>
+                <a:r>
+                  <a:rPr lang="en-US" dirty="0" err="1"/>
+                  <a:t>tagja</a:t>
+                </a:r>
+                <a:r>
+                  <a:rPr lang="en-US" dirty="0"/>
+                  <a:t> (</a:t>
+                </a:r>
+                <a14:m>
+                  <m:oMath xmlns:m="http://schemas.openxmlformats.org/officeDocument/2006/math">
+                    <m:r>
+                      <a:rPr lang="en-US" b="0" i="1" smtClean="0">
+                        <a:latin typeface="Cambria Math" panose="02040503050406030204" pitchFamily="18" charset="0"/>
+                      </a:rPr>
+                      <m:t>𝑥𝑦</m:t>
+                    </m:r>
+                  </m:oMath>
+                </a14:m>
+                <a:r>
+                  <a:rPr lang="en-US" dirty="0"/>
+                  <a:t>) </a:t>
+                </a:r>
+                <a:r>
+                  <a:rPr lang="en-US" dirty="0" err="1"/>
+                  <a:t>vidáman</a:t>
+                </a:r>
+                <a:r>
+                  <a:rPr lang="en-US" dirty="0"/>
+                  <a:t> </a:t>
+                </a:r>
+                <a:r>
+                  <a:rPr lang="en-US" dirty="0" err="1"/>
+                  <a:t>átpakolható</a:t>
+                </a:r>
+                <a:r>
+                  <a:rPr lang="en-US" dirty="0"/>
+                  <a:t> a </a:t>
+                </a:r>
+                <a14:m>
+                  <m:oMath xmlns:m="http://schemas.openxmlformats.org/officeDocument/2006/math">
+                    <m:sSup>
+                      <m:sSupPr>
+                        <m:ctrlPr>
+                          <a:rPr lang="en-US" i="1" smtClean="0">
+                            <a:latin typeface="Cambria Math" panose="02040503050406030204" pitchFamily="18" charset="0"/>
+                          </a:rPr>
+                        </m:ctrlPr>
+                      </m:sSupPr>
+                      <m:e>
+                        <m:r>
+                          <a:rPr lang="en-US" b="0" i="1" smtClean="0">
+                            <a:latin typeface="Cambria Math" panose="02040503050406030204" pitchFamily="18" charset="0"/>
+                          </a:rPr>
+                          <m:t>[0, 1]</m:t>
+                        </m:r>
+                      </m:e>
+                      <m:sup>
+                        <m:r>
+                          <a:rPr lang="en-US" b="0" i="1" smtClean="0">
+                            <a:latin typeface="Cambria Math" panose="02040503050406030204" pitchFamily="18" charset="0"/>
+                          </a:rPr>
+                          <m:t>2</m:t>
+                        </m:r>
+                      </m:sup>
+                    </m:sSup>
+                  </m:oMath>
+                </a14:m>
+                <a:r>
+                  <a:rPr lang="en-US" dirty="0"/>
+                  <a:t> </a:t>
+                </a:r>
+                <a:r>
+                  <a:rPr lang="en-US" dirty="0" err="1"/>
+                  <a:t>intervallumba</a:t>
+                </a:r>
+                <a:r>
+                  <a:rPr lang="en-US" dirty="0"/>
+                  <a:t>…</a:t>
+                </a:r>
+              </a:p>
+              <a:p>
+                <a:pPr>
+                  <a:buFont typeface="Wingdings" panose="05000000000000000000" pitchFamily="2" charset="2"/>
+                  <a:buChar char="§"/>
+                </a:pPr>
+                <a:r>
+                  <a:rPr lang="en-US" dirty="0"/>
+                  <a:t>…</a:t>
+                </a:r>
+                <a:r>
+                  <a:rPr lang="en-US" dirty="0" err="1"/>
+                  <a:t>azaz</a:t>
+                </a:r>
+                <a:r>
+                  <a:rPr lang="en-US" dirty="0"/>
+                  <a:t> </a:t>
+                </a:r>
+                <a:r>
+                  <a:rPr lang="en-US" dirty="0" err="1"/>
+                  <a:t>használható</a:t>
+                </a:r>
+                <a:r>
+                  <a:rPr lang="en-US" dirty="0"/>
+                  <a:t> </a:t>
+                </a:r>
+                <a:r>
+                  <a:rPr lang="en-US" dirty="0" err="1"/>
+                  <a:t>textúra</a:t>
+                </a:r>
+                <a:r>
+                  <a:rPr lang="en-US" dirty="0"/>
+                  <a:t> </a:t>
+                </a:r>
+                <a:r>
+                  <a:rPr lang="en-US" dirty="0" err="1"/>
+                  <a:t>címzésre</a:t>
+                </a:r>
+                <a:r>
+                  <a:rPr lang="en-US" dirty="0"/>
+                  <a:t>. </a:t>
+                </a:r>
+                <a:r>
+                  <a:rPr lang="en-US" dirty="0" err="1"/>
+                  <a:t>Így</a:t>
+                </a:r>
+                <a:r>
+                  <a:rPr lang="en-US" dirty="0"/>
+                  <a:t> </a:t>
+                </a:r>
+                <a:r>
+                  <a:rPr lang="en-US" dirty="0" err="1"/>
+                  <a:t>csinálsz</a:t>
+                </a:r>
+                <a:r>
+                  <a:rPr lang="en-US" dirty="0"/>
+                  <a:t> 3D-ben </a:t>
+                </a:r>
+                <a:r>
+                  <a:rPr lang="en-US" dirty="0" err="1"/>
+                  <a:t>projektort</a:t>
+                </a:r>
+                <a:r>
+                  <a:rPr lang="en-US" dirty="0"/>
+                  <a:t>.</a:t>
+                </a:r>
+              </a:p>
+              <a:p>
+                <a:pPr>
+                  <a:buFont typeface="Wingdings" panose="05000000000000000000" pitchFamily="2" charset="2"/>
+                  <a:buChar char="§"/>
+                </a:pPr>
+                <a:endParaRPr lang="en-US" dirty="0"/>
+              </a:p>
+              <a:p>
+                <a:pPr>
+                  <a:buFont typeface="Wingdings" panose="05000000000000000000" pitchFamily="2" charset="2"/>
+                  <a:buChar char="§"/>
+                </a:pPr>
+                <a:r>
+                  <a:rPr lang="en-US" dirty="0" err="1"/>
+                  <a:t>Ezek</a:t>
+                </a:r>
+                <a:r>
+                  <a:rPr lang="en-US" dirty="0"/>
+                  <a:t> </a:t>
+                </a:r>
+                <a:r>
+                  <a:rPr lang="en-US" dirty="0" err="1"/>
+                  <a:t>után</a:t>
+                </a:r>
+                <a:r>
+                  <a:rPr lang="en-US" dirty="0"/>
+                  <a:t> </a:t>
+                </a:r>
+                <a:r>
+                  <a:rPr lang="en-US" dirty="0" err="1"/>
+                  <a:t>nem</a:t>
+                </a:r>
+                <a:r>
+                  <a:rPr lang="en-US" dirty="0"/>
+                  <a:t> </a:t>
+                </a:r>
+                <a:r>
+                  <a:rPr lang="en-US" dirty="0" err="1"/>
+                  <a:t>túl</a:t>
+                </a:r>
+                <a:r>
+                  <a:rPr lang="en-US" dirty="0"/>
+                  <a:t> </a:t>
+                </a:r>
+                <a:r>
+                  <a:rPr lang="en-US" dirty="0" err="1"/>
+                  <a:t>meglepő</a:t>
+                </a:r>
+                <a:r>
+                  <a:rPr lang="en-US" dirty="0"/>
+                  <a:t>, </a:t>
+                </a:r>
+                <a:r>
+                  <a:rPr lang="en-US" dirty="0" err="1"/>
+                  <a:t>hogy</a:t>
+                </a:r>
+                <a:r>
+                  <a:rPr lang="en-US" dirty="0"/>
+                  <a:t> </a:t>
+                </a:r>
+                <a:r>
+                  <a:rPr lang="en-US" dirty="0" err="1"/>
+                  <a:t>az</a:t>
+                </a:r>
+                <a:r>
+                  <a:rPr lang="en-US" dirty="0"/>
+                  <a:t> </a:t>
+                </a:r>
+                <a:r>
+                  <a:rPr lang="en-US" dirty="0" err="1"/>
+                  <a:t>árnyék</a:t>
+                </a:r>
+                <a:r>
+                  <a:rPr lang="en-US" dirty="0"/>
+                  <a:t> </a:t>
+                </a:r>
+                <a:r>
+                  <a:rPr lang="en-US" dirty="0" err="1"/>
+                  <a:t>generálásához</a:t>
+                </a:r>
+                <a:r>
+                  <a:rPr lang="en-US" dirty="0"/>
+                  <a:t> is </a:t>
+                </a:r>
+                <a:r>
+                  <a:rPr lang="en-US" dirty="0" err="1"/>
+                  <a:t>ezt</a:t>
+                </a:r>
+                <a:r>
+                  <a:rPr lang="en-US" dirty="0"/>
+                  <a:t> </a:t>
+                </a:r>
+                <a:r>
+                  <a:rPr lang="en-US" dirty="0" err="1"/>
+                  <a:t>fogjuk</a:t>
+                </a:r>
+                <a:r>
+                  <a:rPr lang="en-US" dirty="0"/>
+                  <a:t> </a:t>
+                </a:r>
+                <a:r>
+                  <a:rPr lang="en-US" dirty="0" err="1"/>
+                  <a:t>használni</a:t>
+                </a:r>
+                <a:r>
+                  <a:rPr lang="en-US" dirty="0"/>
+                  <a:t>; a </a:t>
+                </a:r>
+                <a:r>
+                  <a:rPr lang="en-US" i="1" dirty="0"/>
+                  <a:t>shadow map</a:t>
+                </a:r>
+                <a:r>
+                  <a:rPr lang="en-US" dirty="0"/>
+                  <a:t>-et a </a:t>
+                </a:r>
+                <a:r>
+                  <a:rPr lang="en-US" dirty="0" err="1"/>
+                  <a:t>fény</a:t>
+                </a:r>
+                <a:r>
+                  <a:rPr lang="en-US" dirty="0"/>
+                  <a:t> </a:t>
+                </a:r>
+                <a:r>
+                  <a:rPr lang="en-US" dirty="0" err="1"/>
+                  <a:t>irányából</a:t>
+                </a:r>
+                <a:r>
+                  <a:rPr lang="en-US" dirty="0"/>
+                  <a:t> </a:t>
+                </a:r>
+                <a:r>
+                  <a:rPr lang="en-US" dirty="0" err="1"/>
+                  <a:t>rávetítjük</a:t>
+                </a:r>
+                <a:r>
+                  <a:rPr lang="en-US" dirty="0"/>
+                  <a:t> a </a:t>
+                </a:r>
+                <a:r>
+                  <a:rPr lang="en-US" dirty="0" err="1"/>
+                  <a:t>jelenetre</a:t>
+                </a:r>
+                <a:r>
+                  <a:rPr lang="en-US" dirty="0"/>
+                  <a:t>…</a:t>
+                </a:r>
+              </a:p>
+              <a:p>
+                <a:pPr>
+                  <a:buFont typeface="Wingdings" panose="05000000000000000000" pitchFamily="2" charset="2"/>
+                  <a:buChar char="§"/>
+                </a:pPr>
+                <a:r>
+                  <a:rPr lang="en-US" dirty="0"/>
+                  <a:t>…</a:t>
+                </a:r>
+                <a:r>
+                  <a:rPr lang="en-US" dirty="0" err="1"/>
+                  <a:t>és</a:t>
+                </a:r>
+                <a:r>
+                  <a:rPr lang="en-US" dirty="0"/>
+                  <a:t> </a:t>
+                </a:r>
+                <a:r>
+                  <a:rPr lang="en-US" dirty="0" err="1"/>
+                  <a:t>alkalmazzuk</a:t>
+                </a:r>
+                <a:r>
+                  <a:rPr lang="en-US" dirty="0"/>
+                  <a:t> a </a:t>
+                </a:r>
+                <a:r>
+                  <a:rPr lang="en-US" dirty="0" err="1"/>
+                  <a:t>fenti</a:t>
+                </a:r>
+                <a:r>
+                  <a:rPr lang="en-US" dirty="0"/>
+                  <a:t> </a:t>
+                </a:r>
+                <a14:m>
+                  <m:oMath xmlns:m="http://schemas.openxmlformats.org/officeDocument/2006/math">
+                    <m:r>
+                      <a:rPr lang="en-US" b="0" i="1" smtClean="0">
+                        <a:latin typeface="Cambria Math" panose="02040503050406030204" pitchFamily="18" charset="0"/>
+                      </a:rPr>
+                      <m:t>𝑓</m:t>
+                    </m:r>
+                    <m:r>
+                      <a:rPr lang="en-US" b="0" i="1" smtClean="0">
+                        <a:latin typeface="Cambria Math" panose="02040503050406030204" pitchFamily="18" charset="0"/>
+                      </a:rPr>
+                      <m:t>(</m:t>
+                    </m:r>
+                    <m:r>
+                      <a:rPr lang="en-US" b="0" i="1" smtClean="0">
+                        <a:latin typeface="Cambria Math" panose="02040503050406030204" pitchFamily="18" charset="0"/>
+                      </a:rPr>
+                      <m:t>𝑑</m:t>
+                    </m:r>
+                    <m:r>
+                      <a:rPr lang="en-US" b="0" i="1" smtClean="0">
+                        <a:latin typeface="Cambria Math" panose="02040503050406030204" pitchFamily="18" charset="0"/>
+                      </a:rPr>
+                      <m:t>, </m:t>
+                    </m:r>
+                    <m:r>
+                      <a:rPr lang="en-US" b="0" i="1" smtClean="0">
+                        <a:latin typeface="Cambria Math" panose="02040503050406030204" pitchFamily="18" charset="0"/>
+                      </a:rPr>
+                      <m:t>𝑧</m:t>
+                    </m:r>
+                    <m:r>
+                      <a:rPr lang="en-US" b="0" i="1" smtClean="0">
+                        <a:latin typeface="Cambria Math" panose="02040503050406030204" pitchFamily="18" charset="0"/>
+                      </a:rPr>
+                      <m:t>)</m:t>
+                    </m:r>
+                  </m:oMath>
+                </a14:m>
+                <a:r>
+                  <a:rPr lang="en-US" dirty="0"/>
+                  <a:t> </a:t>
+                </a:r>
+                <a:r>
+                  <a:rPr lang="en-US" dirty="0" err="1"/>
+                  <a:t>függvényt</a:t>
+                </a:r>
+                <a:r>
+                  <a:rPr lang="en-US" dirty="0"/>
+                  <a:t>.</a:t>
+                </a:r>
+              </a:p>
+              <a:p>
+                <a:pPr>
+                  <a:buFont typeface="Wingdings" panose="05000000000000000000" pitchFamily="2" charset="2"/>
+                  <a:buChar char="§"/>
+                </a:pPr>
+                <a:r>
+                  <a:rPr lang="en-US" b="1" dirty="0" err="1"/>
+                  <a:t>Fontos</a:t>
+                </a:r>
+                <a:r>
+                  <a:rPr lang="en-US" dirty="0"/>
+                  <a:t>: </a:t>
+                </a:r>
+                <a:r>
+                  <a:rPr lang="en-US" dirty="0" err="1"/>
+                  <a:t>ugyanúgy</a:t>
+                </a:r>
+                <a:r>
+                  <a:rPr lang="en-US" dirty="0"/>
+                  <a:t> </a:t>
+                </a:r>
+                <a:r>
+                  <a:rPr lang="en-US" dirty="0" err="1"/>
+                  <a:t>számolj</a:t>
+                </a:r>
+                <a:r>
+                  <a:rPr lang="en-US" dirty="0"/>
+                  <a:t> </a:t>
+                </a:r>
+                <a:r>
+                  <a:rPr lang="en-US" dirty="0" err="1"/>
+                  <a:t>mindkét</a:t>
+                </a:r>
+                <a:r>
+                  <a:rPr lang="en-US" dirty="0"/>
+                  <a:t> </a:t>
+                </a:r>
+                <a:r>
+                  <a:rPr lang="en-US" dirty="0" err="1"/>
+                  <a:t>esetben</a:t>
+                </a:r>
+                <a:r>
+                  <a:rPr lang="en-US" dirty="0"/>
+                  <a:t>! (</a:t>
+                </a:r>
+                <a:r>
+                  <a:rPr lang="en-US" i="1" dirty="0"/>
+                  <a:t>shadow map</a:t>
+                </a:r>
+                <a:r>
+                  <a:rPr lang="en-US" dirty="0"/>
+                  <a:t> </a:t>
+                </a:r>
+                <a:r>
+                  <a:rPr lang="en-US" dirty="0" err="1"/>
+                  <a:t>előállításkor</a:t>
+                </a:r>
+                <a:r>
+                  <a:rPr lang="en-US" dirty="0"/>
+                  <a:t> ill. </a:t>
+                </a:r>
+                <a:r>
+                  <a:rPr lang="en-US" dirty="0" err="1"/>
+                  <a:t>vetítéskor</a:t>
+                </a:r>
+                <a:r>
+                  <a:rPr lang="en-US" dirty="0"/>
+                  <a:t>)</a:t>
+                </a:r>
+                <a:endParaRPr lang="hu-HU" dirty="0"/>
+              </a:p>
+            </p:txBody>
+          </p:sp>
+        </mc:Choice>
+        <mc:Fallback>
+          <p:sp>
+            <p:nvSpPr>
+              <p:cNvPr id="3" name="Content Placeholder 2">
+                <a:extLst>
+                  <a:ext uri="{FF2B5EF4-FFF2-40B4-BE49-F238E27FC236}">
+                    <a16:creationId xmlns:a16="http://schemas.microsoft.com/office/drawing/2014/main" id="{B577BDB9-109F-41E3-B8D6-A211AF73A294}"/>
+                  </a:ext>
+                </a:extLst>
+              </p:cNvPr>
+              <p:cNvSpPr>
+                <a:spLocks noGrp="1" noRot="1" noChangeAspect="1" noMove="1" noResize="1" noEditPoints="1" noAdjustHandles="1" noChangeArrowheads="1" noChangeShapeType="1" noTextEdit="1"/>
+              </p:cNvSpPr>
+              <p:nvPr>
+                <p:ph idx="1"/>
+              </p:nvPr>
+            </p:nvSpPr>
+            <p:spPr>
+              <a:blipFill>
+                <a:blip r:embed="rId2"/>
+                <a:stretch>
+                  <a:fillRect l="-1455" t="-1667"/>
+                </a:stretch>
+              </a:blipFill>
+            </p:spPr>
+            <p:txBody>
+              <a:bodyPr/>
+              <a:lstStyle/>
+              <a:p>
+                <a:r>
+                  <a:rPr lang="hu-HU">
+                    <a:noFill/>
+                  </a:rPr>
+                  <a:t> </a:t>
+                </a:r>
+              </a:p>
+            </p:txBody>
+          </p:sp>
+        </mc:Fallback>
+      </mc:AlternateContent>
+    </p:spTree>
+    <p:extLst>
+      <p:ext uri="{BB962C8B-B14F-4D97-AF65-F5344CB8AC3E}">
+        <p14:creationId xmlns:p14="http://schemas.microsoft.com/office/powerpoint/2010/main" val="152593203"/>
+      </p:ext>
+    </p:extLst>
+  </p:cSld>
+  <p:clrMapOvr>
+    <a:masterClrMapping/>
+  </p:clrMapOvr>
+</p:sld>
+</file>
+
+<file path=ppt/slides/slide6.xml><?xml version="1.0" encoding="utf-8"?>
+<p:sld xmlns:a="http://schemas.openxmlformats.org/drawingml/2006/main" xmlns:r="http://schemas.openxmlformats.org/officeDocument/2006/relationships" xmlns:p="http://schemas.openxmlformats.org/presentationml/2006/main">
+  <p:cSld>
+    <p:spTree>
+      <p:nvGrpSpPr>
+        <p:cNvPr id="1" name=""/>
+        <p:cNvGrpSpPr/>
+        <p:nvPr/>
+      </p:nvGrpSpPr>
+      <p:grpSpPr>
+        <a:xfrm>
+          <a:off x="0" y="0"/>
+          <a:ext cx="0" cy="0"/>
+          <a:chOff x="0" y="0"/>
+          <a:chExt cx="0" cy="0"/>
+        </a:xfrm>
+      </p:grpSpPr>
+      <p:sp>
+        <p:nvSpPr>
+          <p:cNvPr id="2" name="Title 1">
+            <a:extLst>
+              <a:ext uri="{FF2B5EF4-FFF2-40B4-BE49-F238E27FC236}">
+                <a16:creationId xmlns:a16="http://schemas.microsoft.com/office/drawing/2014/main" id="{BAF6423D-97B3-467C-B145-061337E10B28}"/>
+              </a:ext>
+            </a:extLst>
+          </p:cNvPr>
+          <p:cNvSpPr>
+            <a:spLocks noGrp="1"/>
+          </p:cNvSpPr>
+          <p:nvPr>
+            <p:ph type="title"/>
+          </p:nvPr>
+        </p:nvSpPr>
+        <p:spPr/>
+        <p:txBody>
+          <a:bodyPr/>
+          <a:lstStyle/>
+          <a:p>
+            <a:r>
+              <a:rPr lang="en-US" dirty="0"/>
+              <a:t>Mi </a:t>
+            </a:r>
+            <a:r>
+              <a:rPr lang="en-US" dirty="0" err="1"/>
+              <a:t>történik</a:t>
+            </a:r>
+            <a:r>
+              <a:rPr lang="en-US" dirty="0"/>
+              <a:t> </a:t>
+            </a:r>
+            <a:r>
+              <a:rPr lang="en-US" dirty="0" err="1"/>
+              <a:t>megvilágításkor</a:t>
+            </a:r>
+            <a:r>
+              <a:rPr lang="en-US" dirty="0"/>
+              <a:t>?</a:t>
+            </a:r>
+            <a:endParaRPr lang="hu-HU" dirty="0"/>
           </a:p>
         </p:txBody>
       </p:sp>
@@ -6417,7 +7318,7 @@
           <p:cNvPr id="3" name="Content Placeholder 2">
             <a:extLst>
               <a:ext uri="{FF2B5EF4-FFF2-40B4-BE49-F238E27FC236}">
-                <a16:creationId xmlns:a16="http://schemas.microsoft.com/office/drawing/2014/main" id="{B577BDB9-109F-41E3-B8D6-A211AF73A294}"/>
+                <a16:creationId xmlns:a16="http://schemas.microsoft.com/office/drawing/2014/main" id="{C8440E96-9C10-4680-956C-213F31AB9581}"/>
               </a:ext>
             </a:extLst>
           </p:cNvPr>
@@ -6433,14 +7334,1616 @@
           <a:bodyPr/>
           <a:lstStyle/>
           <a:p>
-            <a:endParaRPr lang="hu-HU"/>
+            <a:pPr>
+              <a:buFont typeface="Wingdings" panose="05000000000000000000" pitchFamily="2" charset="2"/>
+              <a:buChar char="§"/>
+            </a:pPr>
+            <a:r>
+              <a:rPr lang="en-US" dirty="0"/>
+              <a:t>A </a:t>
+            </a:r>
+            <a:r>
+              <a:rPr lang="en-US" dirty="0" err="1"/>
+              <a:t>precízióhiányból</a:t>
+            </a:r>
+            <a:r>
+              <a:rPr lang="en-US" dirty="0"/>
+              <a:t> </a:t>
+            </a:r>
+            <a:r>
+              <a:rPr lang="en-US" dirty="0" err="1"/>
+              <a:t>adódó</a:t>
+            </a:r>
+            <a:r>
+              <a:rPr lang="en-US" dirty="0"/>
+              <a:t> </a:t>
+            </a:r>
+            <a:r>
+              <a:rPr lang="en-US" i="1" dirty="0"/>
+              <a:t>artifact</a:t>
+            </a:r>
+            <a:r>
+              <a:rPr lang="en-US" dirty="0"/>
+              <a:t>-</a:t>
+            </a:r>
+            <a:r>
+              <a:rPr lang="en-US" dirty="0" err="1"/>
+              <a:t>okat</a:t>
+            </a:r>
+            <a:r>
+              <a:rPr lang="en-US" dirty="0"/>
+              <a:t> </a:t>
+            </a:r>
+            <a:r>
+              <a:rPr lang="en-US" dirty="0" err="1"/>
+              <a:t>egyelőre</a:t>
+            </a:r>
+            <a:r>
+              <a:rPr lang="en-US" dirty="0"/>
+              <a:t> </a:t>
+            </a:r>
+            <a:r>
+              <a:rPr lang="en-US" dirty="0" err="1"/>
+              <a:t>felejtsük</a:t>
+            </a:r>
+            <a:r>
+              <a:rPr lang="en-US" dirty="0"/>
+              <a:t> el</a:t>
+            </a:r>
+            <a:endParaRPr lang="hu-HU" dirty="0"/>
           </a:p>
         </p:txBody>
       </p:sp>
+      <p:pic>
+        <p:nvPicPr>
+          <p:cNvPr id="5" name="Picture 4">
+            <a:extLst>
+              <a:ext uri="{FF2B5EF4-FFF2-40B4-BE49-F238E27FC236}">
+                <a16:creationId xmlns:a16="http://schemas.microsoft.com/office/drawing/2014/main" id="{6AACB141-5EA6-414C-BA18-4FDB8520CC75}"/>
+              </a:ext>
+            </a:extLst>
+          </p:cNvPr>
+          <p:cNvPicPr>
+            <a:picLocks noChangeAspect="1"/>
+          </p:cNvPicPr>
+          <p:nvPr/>
+        </p:nvPicPr>
+        <p:blipFill>
+          <a:blip r:embed="rId2">
+            <a:extLst>
+              <a:ext uri="{28A0092B-C50C-407E-A947-70E740481C1C}">
+                <a14:useLocalDpi xmlns:a14="http://schemas.microsoft.com/office/drawing/2010/main" val="0"/>
+              </a:ext>
+            </a:extLst>
+          </a:blip>
+          <a:stretch>
+            <a:fillRect/>
+          </a:stretch>
+        </p:blipFill>
+        <p:spPr>
+          <a:xfrm>
+            <a:off x="2438400" y="2302206"/>
+            <a:ext cx="7316221" cy="3896269"/>
+          </a:xfrm>
+          <a:prstGeom prst="rect">
+            <a:avLst/>
+          </a:prstGeom>
+        </p:spPr>
+      </p:pic>
     </p:spTree>
     <p:extLst>
       <p:ext uri="{BB962C8B-B14F-4D97-AF65-F5344CB8AC3E}">
-        <p14:creationId xmlns:p14="http://schemas.microsoft.com/office/powerpoint/2010/main" val="152593203"/>
+        <p14:creationId xmlns:p14="http://schemas.microsoft.com/office/powerpoint/2010/main" val="388690581"/>
+      </p:ext>
+    </p:extLst>
+  </p:cSld>
+  <p:clrMapOvr>
+    <a:masterClrMapping/>
+  </p:clrMapOvr>
+</p:sld>
+</file>
+
+<file path=ppt/slides/slide7.xml><?xml version="1.0" encoding="utf-8"?>
+<p:sld xmlns:a="http://schemas.openxmlformats.org/drawingml/2006/main" xmlns:r="http://schemas.openxmlformats.org/officeDocument/2006/relationships" xmlns:p="http://schemas.openxmlformats.org/presentationml/2006/main">
+  <p:cSld>
+    <p:spTree>
+      <p:nvGrpSpPr>
+        <p:cNvPr id="1" name=""/>
+        <p:cNvGrpSpPr/>
+        <p:nvPr/>
+      </p:nvGrpSpPr>
+      <p:grpSpPr>
+        <a:xfrm>
+          <a:off x="0" y="0"/>
+          <a:ext cx="0" cy="0"/>
+          <a:chOff x="0" y="0"/>
+          <a:chExt cx="0" cy="0"/>
+        </a:xfrm>
+      </p:grpSpPr>
+      <p:sp>
+        <p:nvSpPr>
+          <p:cNvPr id="2" name="Title 1">
+            <a:extLst>
+              <a:ext uri="{FF2B5EF4-FFF2-40B4-BE49-F238E27FC236}">
+                <a16:creationId xmlns:a16="http://schemas.microsoft.com/office/drawing/2014/main" id="{0FCF0C12-918E-4C2B-B8E4-88BC0EDC68B0}"/>
+              </a:ext>
+            </a:extLst>
+          </p:cNvPr>
+          <p:cNvSpPr>
+            <a:spLocks noGrp="1"/>
+          </p:cNvSpPr>
+          <p:nvPr>
+            <p:ph type="title"/>
+          </p:nvPr>
+        </p:nvSpPr>
+        <p:spPr/>
+        <p:txBody>
+          <a:bodyPr/>
+          <a:lstStyle/>
+          <a:p>
+            <a:r>
+              <a:rPr lang="en-US" dirty="0" err="1"/>
+              <a:t>Problémák</a:t>
+            </a:r>
+            <a:r>
+              <a:rPr lang="en-US" dirty="0"/>
+              <a:t>…</a:t>
+            </a:r>
+            <a:endParaRPr lang="hu-HU" dirty="0"/>
+          </a:p>
+        </p:txBody>
+      </p:sp>
+      <p:sp>
+        <p:nvSpPr>
+          <p:cNvPr id="3" name="Content Placeholder 2">
+            <a:extLst>
+              <a:ext uri="{FF2B5EF4-FFF2-40B4-BE49-F238E27FC236}">
+                <a16:creationId xmlns:a16="http://schemas.microsoft.com/office/drawing/2014/main" id="{BB01374E-2B2D-4BC9-A225-54B6E84BD114}"/>
+              </a:ext>
+            </a:extLst>
+          </p:cNvPr>
+          <p:cNvSpPr>
+            <a:spLocks noGrp="1"/>
+          </p:cNvSpPr>
+          <p:nvPr>
+            <p:ph idx="1"/>
+          </p:nvPr>
+        </p:nvSpPr>
+        <p:spPr/>
+        <p:txBody>
+          <a:bodyPr/>
+          <a:lstStyle/>
+          <a:p>
+            <a:pPr>
+              <a:buFont typeface="Wingdings" panose="05000000000000000000" pitchFamily="2" charset="2"/>
+              <a:buChar char="§"/>
+            </a:pPr>
+            <a:r>
+              <a:rPr lang="en-US" dirty="0"/>
+              <a:t>A </a:t>
+            </a:r>
+            <a:r>
+              <a:rPr lang="en-US" dirty="0" err="1"/>
+              <a:t>kép</a:t>
+            </a:r>
+            <a:r>
+              <a:rPr lang="en-US" dirty="0"/>
+              <a:t> </a:t>
+            </a:r>
+            <a:r>
+              <a:rPr lang="en-US" dirty="0" err="1"/>
+              <a:t>alapján</a:t>
+            </a:r>
+            <a:r>
+              <a:rPr lang="en-US" dirty="0"/>
+              <a:t> </a:t>
+            </a:r>
+            <a:r>
+              <a:rPr lang="en-US" dirty="0" err="1"/>
+              <a:t>érthető</a:t>
+            </a:r>
+            <a:r>
+              <a:rPr lang="en-US" dirty="0"/>
+              <a:t>, </a:t>
+            </a:r>
+            <a:r>
+              <a:rPr lang="en-US" dirty="0" err="1"/>
+              <a:t>hogy</a:t>
+            </a:r>
+            <a:r>
+              <a:rPr lang="en-US" dirty="0"/>
+              <a:t> </a:t>
+            </a:r>
+            <a:r>
+              <a:rPr lang="en-US" dirty="0" err="1"/>
+              <a:t>miért</a:t>
+            </a:r>
+            <a:r>
+              <a:rPr lang="en-US" dirty="0"/>
+              <a:t> </a:t>
+            </a:r>
+            <a:r>
+              <a:rPr lang="en-US" dirty="0" err="1"/>
+              <a:t>kell</a:t>
+            </a:r>
+            <a:r>
+              <a:rPr lang="en-US" dirty="0"/>
+              <a:t> </a:t>
+            </a:r>
+            <a:r>
+              <a:rPr lang="en-US" u="sng" dirty="0" err="1"/>
+              <a:t>pontosan</a:t>
+            </a:r>
+            <a:r>
+              <a:rPr lang="en-US" u="sng" dirty="0"/>
+              <a:t> </a:t>
+            </a:r>
+            <a:r>
+              <a:rPr lang="en-US" u="sng" dirty="0" err="1"/>
+              <a:t>ugyanúgy</a:t>
+            </a:r>
+            <a:r>
+              <a:rPr lang="en-US" dirty="0"/>
+              <a:t> </a:t>
+            </a:r>
+            <a:r>
+              <a:rPr lang="en-US" dirty="0" err="1"/>
+              <a:t>számolni</a:t>
+            </a:r>
+            <a:endParaRPr lang="en-US" dirty="0"/>
+          </a:p>
+          <a:p>
+            <a:pPr>
+              <a:buFont typeface="Wingdings" panose="05000000000000000000" pitchFamily="2" charset="2"/>
+              <a:buChar char="§"/>
+            </a:pPr>
+            <a:r>
+              <a:rPr lang="en-US" dirty="0"/>
+              <a:t>De </a:t>
+            </a:r>
+            <a:r>
+              <a:rPr lang="en-US" dirty="0" err="1"/>
+              <a:t>ez</a:t>
+            </a:r>
+            <a:r>
+              <a:rPr lang="en-US" dirty="0"/>
+              <a:t> </a:t>
+            </a:r>
+            <a:r>
+              <a:rPr lang="en-US" dirty="0" err="1"/>
+              <a:t>sajnos</a:t>
+            </a:r>
+            <a:r>
+              <a:rPr lang="en-US" dirty="0"/>
+              <a:t> </a:t>
+            </a:r>
+            <a:r>
+              <a:rPr lang="en-US" dirty="0" err="1"/>
+              <a:t>nem</a:t>
+            </a:r>
+            <a:r>
+              <a:rPr lang="en-US" dirty="0"/>
+              <a:t> </a:t>
+            </a:r>
+            <a:r>
+              <a:rPr lang="en-US" dirty="0" err="1"/>
+              <a:t>ment</a:t>
+            </a:r>
+            <a:r>
+              <a:rPr lang="en-US" dirty="0"/>
+              <a:t> meg </a:t>
+            </a:r>
+            <a:r>
+              <a:rPr lang="en-US" dirty="0" err="1"/>
+              <a:t>az</a:t>
+            </a:r>
+            <a:r>
+              <a:rPr lang="en-US" dirty="0"/>
+              <a:t> </a:t>
+            </a:r>
+            <a:r>
+              <a:rPr lang="en-US" dirty="0" err="1"/>
+              <a:t>ún</a:t>
+            </a:r>
+            <a:r>
+              <a:rPr lang="en-US" dirty="0"/>
+              <a:t>. </a:t>
+            </a:r>
+            <a:r>
+              <a:rPr lang="en-US" i="1" dirty="0"/>
+              <a:t>shadow acne</a:t>
+            </a:r>
+            <a:r>
+              <a:rPr lang="en-US" dirty="0"/>
+              <a:t>-</a:t>
+            </a:r>
+            <a:r>
+              <a:rPr lang="en-US" dirty="0" err="1"/>
+              <a:t>tól</a:t>
+            </a:r>
+            <a:r>
+              <a:rPr lang="en-US" dirty="0"/>
+              <a:t> (</a:t>
+            </a:r>
+            <a:r>
+              <a:rPr lang="en-US" dirty="0" err="1"/>
+              <a:t>önmagával</a:t>
+            </a:r>
+            <a:r>
+              <a:rPr lang="en-US" dirty="0"/>
+              <a:t> </a:t>
+            </a:r>
+            <a:r>
+              <a:rPr lang="en-US" i="1" dirty="0" err="1"/>
+              <a:t>zfight-</a:t>
+            </a:r>
+            <a:r>
+              <a:rPr lang="en-US" dirty="0" err="1"/>
+              <a:t>ol</a:t>
+            </a:r>
+            <a:r>
+              <a:rPr lang="en-US" dirty="0"/>
+              <a:t> </a:t>
+            </a:r>
+            <a:r>
+              <a:rPr lang="en-US" dirty="0" err="1"/>
+              <a:t>az</a:t>
+            </a:r>
+            <a:r>
+              <a:rPr lang="en-US" dirty="0"/>
+              <a:t> </a:t>
+            </a:r>
+            <a:r>
+              <a:rPr lang="en-US" dirty="0" err="1"/>
+              <a:t>árnyék</a:t>
+            </a:r>
+            <a:r>
+              <a:rPr lang="en-US" dirty="0"/>
+              <a:t>)</a:t>
+            </a:r>
+          </a:p>
+          <a:p>
+            <a:pPr>
+              <a:buFont typeface="Wingdings" panose="05000000000000000000" pitchFamily="2" charset="2"/>
+              <a:buChar char="§"/>
+            </a:pPr>
+            <a:endParaRPr lang="en-US" dirty="0"/>
+          </a:p>
+          <a:p>
+            <a:pPr>
+              <a:buFont typeface="Wingdings" panose="05000000000000000000" pitchFamily="2" charset="2"/>
+              <a:buChar char="§"/>
+            </a:pPr>
+            <a:endParaRPr lang="en-US" dirty="0"/>
+          </a:p>
+          <a:p>
+            <a:pPr>
+              <a:buFont typeface="Wingdings" panose="05000000000000000000" pitchFamily="2" charset="2"/>
+              <a:buChar char="§"/>
+            </a:pPr>
+            <a:endParaRPr lang="en-US" dirty="0"/>
+          </a:p>
+          <a:p>
+            <a:pPr>
+              <a:buFont typeface="Wingdings" panose="05000000000000000000" pitchFamily="2" charset="2"/>
+              <a:buChar char="§"/>
+            </a:pPr>
+            <a:endParaRPr lang="en-US" dirty="0"/>
+          </a:p>
+          <a:p>
+            <a:pPr>
+              <a:buFont typeface="Wingdings" panose="05000000000000000000" pitchFamily="2" charset="2"/>
+              <a:buChar char="§"/>
+            </a:pPr>
+            <a:r>
+              <a:rPr lang="en-US" dirty="0" err="1"/>
+              <a:t>Univerzális</a:t>
+            </a:r>
+            <a:r>
+              <a:rPr lang="en-US" dirty="0"/>
+              <a:t> </a:t>
+            </a:r>
+            <a:r>
+              <a:rPr lang="en-US" dirty="0" err="1"/>
+              <a:t>megoldás</a:t>
+            </a:r>
+            <a:r>
+              <a:rPr lang="en-US" dirty="0"/>
+              <a:t> </a:t>
+            </a:r>
+            <a:r>
+              <a:rPr lang="en-US" dirty="0" err="1"/>
+              <a:t>nincs</a:t>
+            </a:r>
+            <a:r>
+              <a:rPr lang="en-US" dirty="0"/>
+              <a:t>, de </a:t>
+            </a:r>
+            <a:r>
+              <a:rPr lang="en-US" dirty="0" err="1"/>
+              <a:t>fejlettebb</a:t>
+            </a:r>
+            <a:r>
+              <a:rPr lang="en-US" dirty="0"/>
+              <a:t> </a:t>
+            </a:r>
+            <a:r>
+              <a:rPr lang="en-US" dirty="0" err="1"/>
+              <a:t>módszerek</a:t>
+            </a:r>
+            <a:r>
+              <a:rPr lang="en-US" dirty="0"/>
+              <a:t> </a:t>
+            </a:r>
+            <a:r>
+              <a:rPr lang="en-US" dirty="0" err="1"/>
+              <a:t>automatikusan</a:t>
+            </a:r>
+            <a:r>
+              <a:rPr lang="en-US" dirty="0"/>
+              <a:t> </a:t>
+            </a:r>
+            <a:r>
+              <a:rPr lang="en-US" dirty="0" err="1"/>
+              <a:t>kiszűrik</a:t>
+            </a:r>
+            <a:r>
+              <a:rPr lang="en-US" dirty="0"/>
+              <a:t> (</a:t>
+            </a:r>
+            <a:r>
+              <a:rPr lang="en-US" dirty="0" err="1"/>
+              <a:t>itt</a:t>
+            </a:r>
+            <a:r>
+              <a:rPr lang="en-US" dirty="0"/>
+              <a:t> </a:t>
+            </a:r>
+            <a:r>
+              <a:rPr lang="en-US" dirty="0" err="1"/>
+              <a:t>csak</a:t>
+            </a:r>
+            <a:r>
+              <a:rPr lang="en-US" dirty="0"/>
+              <a:t> </a:t>
+            </a:r>
+            <a:r>
+              <a:rPr lang="en-US" dirty="0" err="1"/>
+              <a:t>egyet</a:t>
+            </a:r>
+            <a:r>
+              <a:rPr lang="en-US" dirty="0"/>
+              <a:t> </a:t>
+            </a:r>
+            <a:r>
+              <a:rPr lang="en-US" dirty="0" err="1"/>
+              <a:t>fogok</a:t>
+            </a:r>
+            <a:r>
+              <a:rPr lang="en-US" dirty="0"/>
+              <a:t> </a:t>
+            </a:r>
+            <a:r>
+              <a:rPr lang="en-US" dirty="0" err="1"/>
+              <a:t>majd</a:t>
+            </a:r>
+            <a:r>
+              <a:rPr lang="en-US" dirty="0"/>
+              <a:t> </a:t>
+            </a:r>
+            <a:r>
+              <a:rPr lang="en-US" dirty="0" err="1"/>
+              <a:t>megemlíteni</a:t>
+            </a:r>
+            <a:r>
+              <a:rPr lang="en-US" dirty="0"/>
+              <a:t>, a </a:t>
+            </a:r>
+            <a:r>
+              <a:rPr lang="en-US" i="1" dirty="0"/>
+              <a:t>variance shadow mapping</a:t>
+            </a:r>
+            <a:r>
+              <a:rPr lang="en-US" dirty="0"/>
+              <a:t>-et)</a:t>
+            </a:r>
+          </a:p>
+          <a:p>
+            <a:pPr>
+              <a:buFont typeface="Wingdings" panose="05000000000000000000" pitchFamily="2" charset="2"/>
+              <a:buChar char="§"/>
+            </a:pPr>
+            <a:r>
+              <a:rPr lang="en-US" dirty="0" err="1"/>
+              <a:t>Ajánlott</a:t>
+            </a:r>
+            <a:r>
+              <a:rPr lang="en-US" dirty="0"/>
+              <a:t> </a:t>
+            </a:r>
+            <a:r>
+              <a:rPr lang="en-US" dirty="0" err="1"/>
+              <a:t>irodalmak</a:t>
+            </a:r>
+            <a:r>
+              <a:rPr lang="en-US" dirty="0"/>
+              <a:t>: </a:t>
+            </a:r>
+            <a:r>
+              <a:rPr lang="en-US" dirty="0" err="1">
+                <a:hlinkClick r:id="rId2"/>
+              </a:rPr>
+              <a:t>egyik</a:t>
+            </a:r>
+            <a:r>
+              <a:rPr lang="en-US" dirty="0"/>
+              <a:t>, </a:t>
+            </a:r>
+            <a:r>
+              <a:rPr lang="en-US" dirty="0" err="1">
+                <a:hlinkClick r:id="rId3"/>
+              </a:rPr>
+              <a:t>másik</a:t>
+            </a:r>
+            <a:r>
+              <a:rPr lang="en-US" dirty="0"/>
+              <a:t>, </a:t>
+            </a:r>
+            <a:r>
+              <a:rPr lang="en-US" dirty="0" err="1">
+                <a:hlinkClick r:id="rId4"/>
+              </a:rPr>
+              <a:t>harmadik</a:t>
+            </a:r>
+            <a:endParaRPr lang="hu-HU" dirty="0"/>
+          </a:p>
+        </p:txBody>
+      </p:sp>
+      <p:pic>
+        <p:nvPicPr>
+          <p:cNvPr id="5" name="Picture 4">
+            <a:extLst>
+              <a:ext uri="{FF2B5EF4-FFF2-40B4-BE49-F238E27FC236}">
+                <a16:creationId xmlns:a16="http://schemas.microsoft.com/office/drawing/2014/main" id="{6C78274D-C92C-4021-9CF1-41A8980F060A}"/>
+              </a:ext>
+            </a:extLst>
+          </p:cNvPr>
+          <p:cNvPicPr>
+            <a:picLocks noChangeAspect="1"/>
+          </p:cNvPicPr>
+          <p:nvPr/>
+        </p:nvPicPr>
+        <p:blipFill>
+          <a:blip r:embed="rId5">
+            <a:extLst>
+              <a:ext uri="{28A0092B-C50C-407E-A947-70E740481C1C}">
+                <a14:useLocalDpi xmlns:a14="http://schemas.microsoft.com/office/drawing/2010/main" val="0"/>
+              </a:ext>
+            </a:extLst>
+          </a:blip>
+          <a:stretch>
+            <a:fillRect/>
+          </a:stretch>
+        </p:blipFill>
+        <p:spPr>
+          <a:xfrm>
+            <a:off x="2667000" y="2714360"/>
+            <a:ext cx="6773220" cy="1838582"/>
+          </a:xfrm>
+          <a:prstGeom prst="rect">
+            <a:avLst/>
+          </a:prstGeom>
+        </p:spPr>
+      </p:pic>
+    </p:spTree>
+    <p:extLst>
+      <p:ext uri="{BB962C8B-B14F-4D97-AF65-F5344CB8AC3E}">
+        <p14:creationId xmlns:p14="http://schemas.microsoft.com/office/powerpoint/2010/main" val="1502229215"/>
+      </p:ext>
+    </p:extLst>
+  </p:cSld>
+  <p:clrMapOvr>
+    <a:masterClrMapping/>
+  </p:clrMapOvr>
+</p:sld>
+</file>
+
+<file path=ppt/slides/slide8.xml><?xml version="1.0" encoding="utf-8"?>
+<p:sld xmlns:a="http://schemas.openxmlformats.org/drawingml/2006/main" xmlns:r="http://schemas.openxmlformats.org/officeDocument/2006/relationships" xmlns:p="http://schemas.openxmlformats.org/presentationml/2006/main">
+  <p:cSld>
+    <p:spTree>
+      <p:nvGrpSpPr>
+        <p:cNvPr id="1" name=""/>
+        <p:cNvGrpSpPr/>
+        <p:nvPr/>
+      </p:nvGrpSpPr>
+      <p:grpSpPr>
+        <a:xfrm>
+          <a:off x="0" y="0"/>
+          <a:ext cx="0" cy="0"/>
+          <a:chOff x="0" y="0"/>
+          <a:chExt cx="0" cy="0"/>
+        </a:xfrm>
+      </p:grpSpPr>
+      <p:sp>
+        <p:nvSpPr>
+          <p:cNvPr id="2" name="Title 1">
+            <a:extLst>
+              <a:ext uri="{FF2B5EF4-FFF2-40B4-BE49-F238E27FC236}">
+                <a16:creationId xmlns:a16="http://schemas.microsoft.com/office/drawing/2014/main" id="{12A0405E-3C0C-4AEB-BE55-C3775025DF6F}"/>
+              </a:ext>
+            </a:extLst>
+          </p:cNvPr>
+          <p:cNvSpPr>
+            <a:spLocks noGrp="1"/>
+          </p:cNvSpPr>
+          <p:nvPr>
+            <p:ph type="title"/>
+          </p:nvPr>
+        </p:nvSpPr>
+        <p:spPr/>
+        <p:txBody>
+          <a:bodyPr/>
+          <a:lstStyle/>
+          <a:p>
+            <a:r>
+              <a:rPr lang="en-US" dirty="0"/>
+              <a:t>…</a:t>
+            </a:r>
+            <a:r>
+              <a:rPr lang="en-US" dirty="0" err="1"/>
+              <a:t>és</a:t>
+            </a:r>
+            <a:r>
+              <a:rPr lang="en-US" dirty="0"/>
+              <a:t> a perspective aliasing</a:t>
+            </a:r>
+            <a:endParaRPr lang="hu-HU" dirty="0"/>
+          </a:p>
+        </p:txBody>
+      </p:sp>
+      <p:sp>
+        <p:nvSpPr>
+          <p:cNvPr id="3" name="Content Placeholder 2">
+            <a:extLst>
+              <a:ext uri="{FF2B5EF4-FFF2-40B4-BE49-F238E27FC236}">
+                <a16:creationId xmlns:a16="http://schemas.microsoft.com/office/drawing/2014/main" id="{6E0100F7-6DBB-402F-A3CF-803F58054FD9}"/>
+              </a:ext>
+            </a:extLst>
+          </p:cNvPr>
+          <p:cNvSpPr>
+            <a:spLocks noGrp="1"/>
+          </p:cNvSpPr>
+          <p:nvPr>
+            <p:ph idx="1"/>
+          </p:nvPr>
+        </p:nvSpPr>
+        <p:spPr/>
+        <p:txBody>
+          <a:bodyPr/>
+          <a:lstStyle/>
+          <a:p>
+            <a:pPr>
+              <a:buFont typeface="Wingdings" panose="05000000000000000000" pitchFamily="2" charset="2"/>
+              <a:buChar char="§"/>
+            </a:pPr>
+            <a:r>
+              <a:rPr lang="en-US" dirty="0"/>
+              <a:t>A </a:t>
+            </a:r>
+            <a:r>
+              <a:rPr lang="en-US" dirty="0" err="1"/>
+              <a:t>projektív</a:t>
+            </a:r>
+            <a:r>
+              <a:rPr lang="en-US" dirty="0"/>
+              <a:t> </a:t>
+            </a:r>
+            <a:r>
+              <a:rPr lang="en-US" dirty="0" err="1"/>
+              <a:t>textúrázás</a:t>
+            </a:r>
+            <a:r>
+              <a:rPr lang="en-US" dirty="0"/>
+              <a:t> </a:t>
+            </a:r>
+            <a:r>
+              <a:rPr lang="en-US" dirty="0" err="1"/>
+              <a:t>miatt</a:t>
+            </a:r>
+            <a:r>
+              <a:rPr lang="en-US" dirty="0"/>
+              <a:t> a </a:t>
+            </a:r>
+            <a:r>
+              <a:rPr lang="en-US" i="1" dirty="0"/>
+              <a:t>shadow map</a:t>
+            </a:r>
+            <a:r>
+              <a:rPr lang="en-US" dirty="0"/>
+              <a:t> “</a:t>
+            </a:r>
+            <a:r>
+              <a:rPr lang="en-US" dirty="0" err="1"/>
+              <a:t>szétterül</a:t>
+            </a:r>
+            <a:r>
+              <a:rPr lang="en-US" dirty="0"/>
+              <a:t>” a </a:t>
+            </a:r>
+            <a:r>
+              <a:rPr lang="en-US" dirty="0" err="1"/>
+              <a:t>jeleneten</a:t>
+            </a:r>
+            <a:r>
+              <a:rPr lang="en-US" dirty="0"/>
+              <a:t>, </a:t>
+            </a:r>
+            <a:r>
+              <a:rPr lang="en-US" dirty="0" err="1"/>
+              <a:t>azaz</a:t>
+            </a:r>
+            <a:r>
+              <a:rPr lang="en-US" dirty="0"/>
+              <a:t> </a:t>
+            </a:r>
+            <a:r>
+              <a:rPr lang="en-US" dirty="0" err="1"/>
+              <a:t>egy</a:t>
+            </a:r>
+            <a:r>
+              <a:rPr lang="en-US" dirty="0"/>
+              <a:t> </a:t>
+            </a:r>
+            <a:r>
+              <a:rPr lang="en-US" dirty="0" err="1"/>
+              <a:t>konkrét</a:t>
+            </a:r>
+            <a:r>
+              <a:rPr lang="en-US" dirty="0"/>
+              <a:t> </a:t>
+            </a:r>
+            <a:r>
+              <a:rPr lang="en-US" i="1" dirty="0"/>
+              <a:t>shadow map </a:t>
+            </a:r>
+            <a:r>
+              <a:rPr lang="en-US" i="1" dirty="0" err="1"/>
+              <a:t>texel</a:t>
+            </a:r>
+            <a:r>
+              <a:rPr lang="en-US" dirty="0" err="1"/>
+              <a:t>-hez</a:t>
+            </a:r>
+            <a:r>
+              <a:rPr lang="en-US" dirty="0"/>
+              <a:t> </a:t>
+            </a:r>
+            <a:r>
+              <a:rPr lang="en-US" dirty="0" err="1"/>
+              <a:t>sok</a:t>
+            </a:r>
+            <a:r>
+              <a:rPr lang="en-US" dirty="0"/>
+              <a:t> </a:t>
+            </a:r>
+            <a:r>
+              <a:rPr lang="en-US" dirty="0" err="1"/>
+              <a:t>képernyőpixel</a:t>
+            </a:r>
+            <a:r>
+              <a:rPr lang="en-US" dirty="0"/>
+              <a:t> </a:t>
+            </a:r>
+            <a:r>
+              <a:rPr lang="en-US" dirty="0" err="1"/>
+              <a:t>tartozik</a:t>
+            </a:r>
+            <a:endParaRPr lang="en-US" dirty="0"/>
+          </a:p>
+          <a:p>
+            <a:pPr>
+              <a:buFont typeface="Wingdings" panose="05000000000000000000" pitchFamily="2" charset="2"/>
+              <a:buChar char="§"/>
+            </a:pPr>
+            <a:r>
+              <a:rPr lang="en-US" dirty="0" err="1"/>
+              <a:t>Összehasonlítás</a:t>
+            </a:r>
+            <a:r>
+              <a:rPr lang="en-US" dirty="0"/>
+              <a:t> (</a:t>
+            </a:r>
+            <a:r>
+              <a:rPr lang="en-US" dirty="0" err="1"/>
+              <a:t>szándékosan</a:t>
+            </a:r>
+            <a:r>
+              <a:rPr lang="en-US" dirty="0"/>
+              <a:t> </a:t>
+            </a:r>
+            <a:r>
+              <a:rPr lang="en-US" dirty="0" err="1"/>
+              <a:t>alacsony</a:t>
+            </a:r>
+            <a:r>
+              <a:rPr lang="en-US" dirty="0"/>
+              <a:t> </a:t>
+            </a:r>
+            <a:r>
+              <a:rPr lang="en-US" i="1" dirty="0"/>
+              <a:t>SM</a:t>
+            </a:r>
+            <a:r>
+              <a:rPr lang="en-US" dirty="0"/>
+              <a:t> </a:t>
+            </a:r>
+            <a:r>
+              <a:rPr lang="en-US" dirty="0" err="1"/>
+              <a:t>felbontással</a:t>
+            </a:r>
+            <a:r>
+              <a:rPr lang="en-US" dirty="0"/>
+              <a:t>):</a:t>
+            </a:r>
+          </a:p>
+          <a:p>
+            <a:pPr>
+              <a:buFont typeface="Wingdings" panose="05000000000000000000" pitchFamily="2" charset="2"/>
+              <a:buChar char="§"/>
+            </a:pPr>
+            <a:endParaRPr lang="en-US" dirty="0"/>
+          </a:p>
+          <a:p>
+            <a:pPr>
+              <a:buFont typeface="Wingdings" panose="05000000000000000000" pitchFamily="2" charset="2"/>
+              <a:buChar char="§"/>
+            </a:pPr>
+            <a:endParaRPr lang="en-US" dirty="0"/>
+          </a:p>
+          <a:p>
+            <a:pPr>
+              <a:buFont typeface="Wingdings" panose="05000000000000000000" pitchFamily="2" charset="2"/>
+              <a:buChar char="§"/>
+            </a:pPr>
+            <a:endParaRPr lang="en-US" dirty="0"/>
+          </a:p>
+          <a:p>
+            <a:pPr>
+              <a:buFont typeface="Wingdings" panose="05000000000000000000" pitchFamily="2" charset="2"/>
+              <a:buChar char="§"/>
+            </a:pPr>
+            <a:endParaRPr lang="en-US" dirty="0"/>
+          </a:p>
+          <a:p>
+            <a:pPr>
+              <a:buFont typeface="Wingdings" panose="05000000000000000000" pitchFamily="2" charset="2"/>
+              <a:buChar char="§"/>
+            </a:pPr>
+            <a:endParaRPr lang="en-US" dirty="0"/>
+          </a:p>
+          <a:p>
+            <a:pPr>
+              <a:buFont typeface="Wingdings" panose="05000000000000000000" pitchFamily="2" charset="2"/>
+              <a:buChar char="§"/>
+            </a:pPr>
+            <a:r>
+              <a:rPr lang="en-US" dirty="0" err="1"/>
+              <a:t>Utóbbi</a:t>
+            </a:r>
+            <a:r>
+              <a:rPr lang="en-US" dirty="0"/>
+              <a:t> </a:t>
+            </a:r>
+            <a:r>
+              <a:rPr lang="en-US" dirty="0" err="1"/>
+              <a:t>kettőt</a:t>
+            </a:r>
+            <a:r>
+              <a:rPr lang="en-US" dirty="0"/>
+              <a:t> </a:t>
+            </a:r>
+            <a:r>
+              <a:rPr lang="en-US" dirty="0" err="1"/>
+              <a:t>tekintem</a:t>
+            </a:r>
+            <a:r>
+              <a:rPr lang="en-US" dirty="0"/>
+              <a:t> </a:t>
+            </a:r>
+            <a:r>
+              <a:rPr lang="en-US" dirty="0" err="1"/>
+              <a:t>át</a:t>
+            </a:r>
+            <a:r>
+              <a:rPr lang="en-US" dirty="0"/>
+              <a:t> </a:t>
+            </a:r>
+            <a:r>
+              <a:rPr lang="en-US" dirty="0" err="1"/>
+              <a:t>először</a:t>
+            </a:r>
+            <a:endParaRPr lang="hu-HU" dirty="0"/>
+          </a:p>
+        </p:txBody>
+      </p:sp>
+      <p:pic>
+        <p:nvPicPr>
+          <p:cNvPr id="5" name="Picture 4">
+            <a:extLst>
+              <a:ext uri="{FF2B5EF4-FFF2-40B4-BE49-F238E27FC236}">
+                <a16:creationId xmlns:a16="http://schemas.microsoft.com/office/drawing/2014/main" id="{E9B8D936-C86D-4002-8CD6-2013EB549019}"/>
+              </a:ext>
+            </a:extLst>
+          </p:cNvPr>
+          <p:cNvPicPr>
+            <a:picLocks noChangeAspect="1"/>
+          </p:cNvPicPr>
+          <p:nvPr/>
+        </p:nvPicPr>
+        <p:blipFill>
+          <a:blip r:embed="rId2">
+            <a:extLst>
+              <a:ext uri="{28A0092B-C50C-407E-A947-70E740481C1C}">
+                <a14:useLocalDpi xmlns:a14="http://schemas.microsoft.com/office/drawing/2010/main" val="0"/>
+              </a:ext>
+            </a:extLst>
+          </a:blip>
+          <a:stretch>
+            <a:fillRect/>
+          </a:stretch>
+        </p:blipFill>
+        <p:spPr>
+          <a:xfrm>
+            <a:off x="2310384" y="3100565"/>
+            <a:ext cx="7573432" cy="1810003"/>
+          </a:xfrm>
+          <a:prstGeom prst="rect">
+            <a:avLst/>
+          </a:prstGeom>
+        </p:spPr>
+      </p:pic>
+    </p:spTree>
+    <p:extLst>
+      <p:ext uri="{BB962C8B-B14F-4D97-AF65-F5344CB8AC3E}">
+        <p14:creationId xmlns:p14="http://schemas.microsoft.com/office/powerpoint/2010/main" val="661645896"/>
+      </p:ext>
+    </p:extLst>
+  </p:cSld>
+  <p:clrMapOvr>
+    <a:masterClrMapping/>
+  </p:clrMapOvr>
+</p:sld>
+</file>
+
+<file path=ppt/slides/slide9.xml><?xml version="1.0" encoding="utf-8"?>
+<p:sld xmlns:a="http://schemas.openxmlformats.org/drawingml/2006/main" xmlns:r="http://schemas.openxmlformats.org/officeDocument/2006/relationships" xmlns:p="http://schemas.openxmlformats.org/presentationml/2006/main">
+  <p:cSld>
+    <p:spTree>
+      <p:nvGrpSpPr>
+        <p:cNvPr id="1" name=""/>
+        <p:cNvGrpSpPr/>
+        <p:nvPr/>
+      </p:nvGrpSpPr>
+      <p:grpSpPr>
+        <a:xfrm>
+          <a:off x="0" y="0"/>
+          <a:ext cx="0" cy="0"/>
+          <a:chOff x="0" y="0"/>
+          <a:chExt cx="0" cy="0"/>
+        </a:xfrm>
+      </p:grpSpPr>
+      <p:sp>
+        <p:nvSpPr>
+          <p:cNvPr id="2" name="Title 1">
+            <a:extLst>
+              <a:ext uri="{FF2B5EF4-FFF2-40B4-BE49-F238E27FC236}">
+                <a16:creationId xmlns:a16="http://schemas.microsoft.com/office/drawing/2014/main" id="{FD4A4119-26D8-4C36-ABEA-F4F10C8E5A58}"/>
+              </a:ext>
+            </a:extLst>
+          </p:cNvPr>
+          <p:cNvSpPr>
+            <a:spLocks noGrp="1"/>
+          </p:cNvSpPr>
+          <p:nvPr>
+            <p:ph type="title"/>
+          </p:nvPr>
+        </p:nvSpPr>
+        <p:spPr/>
+        <p:txBody>
+          <a:bodyPr/>
+          <a:lstStyle/>
+          <a:p>
+            <a:r>
+              <a:rPr lang="en-US" dirty="0"/>
+              <a:t>Percentage Closer Filtering (PCF)</a:t>
+            </a:r>
+            <a:endParaRPr lang="hu-HU" dirty="0"/>
+          </a:p>
+        </p:txBody>
+      </p:sp>
+      <mc:AlternateContent xmlns:mc="http://schemas.openxmlformats.org/markup-compatibility/2006">
+        <mc:Choice xmlns:a14="http://schemas.microsoft.com/office/drawing/2010/main" Requires="a14">
+          <p:sp>
+            <p:nvSpPr>
+              <p:cNvPr id="3" name="Content Placeholder 2">
+                <a:extLst>
+                  <a:ext uri="{FF2B5EF4-FFF2-40B4-BE49-F238E27FC236}">
+                    <a16:creationId xmlns:a16="http://schemas.microsoft.com/office/drawing/2014/main" id="{C5EF5C0D-0210-4F7A-BDF4-51996D18264C}"/>
+                  </a:ext>
+                </a:extLst>
+              </p:cNvPr>
+              <p:cNvSpPr>
+                <a:spLocks noGrp="1"/>
+              </p:cNvSpPr>
+              <p:nvPr>
+                <p:ph idx="1"/>
+              </p:nvPr>
+            </p:nvSpPr>
+            <p:spPr/>
+            <p:txBody>
+              <a:bodyPr/>
+              <a:lstStyle/>
+              <a:p>
+                <a:pPr>
+                  <a:buFont typeface="Wingdings" panose="05000000000000000000" pitchFamily="2" charset="2"/>
+                  <a:buChar char="§"/>
+                </a:pPr>
+                <a:r>
+                  <a:rPr lang="en-US" dirty="0"/>
+                  <a:t>A </a:t>
+                </a:r>
+                <a:r>
+                  <a:rPr lang="en-US" dirty="0" err="1"/>
+                  <a:t>rossz</a:t>
+                </a:r>
+                <a:r>
+                  <a:rPr lang="en-US" dirty="0"/>
+                  <a:t> </a:t>
+                </a:r>
+                <a:r>
+                  <a:rPr lang="en-US" dirty="0" err="1"/>
+                  <a:t>ötlet</a:t>
+                </a:r>
+                <a:r>
+                  <a:rPr lang="en-US" dirty="0"/>
+                  <a:t>, </a:t>
+                </a:r>
+                <a:r>
+                  <a:rPr lang="en-US" dirty="0" err="1"/>
+                  <a:t>amit</a:t>
+                </a:r>
+                <a:r>
+                  <a:rPr lang="en-US" dirty="0"/>
+                  <a:t> </a:t>
+                </a:r>
+                <a:r>
+                  <a:rPr lang="en-US" dirty="0" err="1"/>
+                  <a:t>szinte</a:t>
+                </a:r>
+                <a:r>
+                  <a:rPr lang="en-US" dirty="0"/>
+                  <a:t> </a:t>
+                </a:r>
+                <a:r>
+                  <a:rPr lang="en-US" dirty="0" err="1"/>
+                  <a:t>mindenki</a:t>
+                </a:r>
+                <a:r>
+                  <a:rPr lang="en-US" dirty="0"/>
+                  <a:t> </a:t>
+                </a:r>
+                <a:r>
+                  <a:rPr lang="en-US" dirty="0" err="1"/>
+                  <a:t>elkövet</a:t>
+                </a:r>
+                <a:r>
+                  <a:rPr lang="en-US" dirty="0"/>
+                  <a:t>: </a:t>
+                </a:r>
+                <a:r>
+                  <a:rPr lang="en-US" dirty="0" err="1"/>
+                  <a:t>megblurozza</a:t>
+                </a:r>
+                <a:r>
+                  <a:rPr lang="en-US" dirty="0"/>
+                  <a:t> a </a:t>
+                </a:r>
+                <a:r>
+                  <a:rPr lang="en-US" i="1" dirty="0"/>
+                  <a:t>shadow map</a:t>
+                </a:r>
+                <a:r>
+                  <a:rPr lang="en-US" dirty="0"/>
+                  <a:t>-et…</a:t>
+                </a:r>
+              </a:p>
+              <a:p>
+                <a:pPr>
+                  <a:buFont typeface="Wingdings" panose="05000000000000000000" pitchFamily="2" charset="2"/>
+                  <a:buChar char="§"/>
+                </a:pPr>
+                <a:r>
+                  <a:rPr lang="en-US" dirty="0"/>
+                  <a:t>…de </a:t>
+                </a:r>
+                <a:r>
+                  <a:rPr lang="en-US" dirty="0" err="1"/>
+                  <a:t>ennek</a:t>
+                </a:r>
+                <a:r>
+                  <a:rPr lang="en-US" dirty="0"/>
+                  <a:t> mi is </a:t>
+                </a:r>
+                <a:r>
+                  <a:rPr lang="en-US" dirty="0" err="1"/>
+                  <a:t>lesz</a:t>
+                </a:r>
+                <a:r>
+                  <a:rPr lang="en-US" dirty="0"/>
+                  <a:t> </a:t>
+                </a:r>
+                <a:r>
+                  <a:rPr lang="en-US" dirty="0" err="1"/>
+                  <a:t>az</a:t>
+                </a:r>
+                <a:r>
+                  <a:rPr lang="en-US" dirty="0"/>
+                  <a:t> </a:t>
+                </a:r>
+                <a:r>
+                  <a:rPr lang="en-US" dirty="0" err="1"/>
+                  <a:t>eredménye</a:t>
+                </a:r>
+                <a:r>
+                  <a:rPr lang="en-US" dirty="0"/>
+                  <a:t>? </a:t>
+                </a:r>
+                <a:r>
+                  <a:rPr lang="en-US" i="1" dirty="0"/>
+                  <a:t>(</a:t>
+                </a:r>
+                <a:r>
+                  <a:rPr lang="en-US" i="1" dirty="0" err="1"/>
+                  <a:t>feladvány</a:t>
+                </a:r>
+                <a:r>
+                  <a:rPr lang="en-US" i="1" dirty="0"/>
+                  <a:t>; </a:t>
+                </a:r>
+                <a:r>
+                  <a:rPr lang="en-US" i="1" dirty="0" err="1"/>
+                  <a:t>tipp</a:t>
+                </a:r>
+                <a:r>
+                  <a:rPr lang="en-US" i="1" dirty="0"/>
+                  <a:t>: </a:t>
+                </a:r>
+                <a:r>
+                  <a:rPr lang="en-US" i="1" dirty="0" err="1"/>
+                  <a:t>marhaság</a:t>
+                </a:r>
+                <a:r>
+                  <a:rPr lang="en-US" i="1" dirty="0"/>
+                  <a:t>)</a:t>
+                </a:r>
+              </a:p>
+              <a:p>
+                <a:pPr>
+                  <a:buFont typeface="Wingdings" panose="05000000000000000000" pitchFamily="2" charset="2"/>
+                  <a:buChar char="§"/>
+                </a:pPr>
+                <a:r>
+                  <a:rPr lang="en-US" dirty="0" err="1"/>
+                  <a:t>Átlagolást</a:t>
+                </a:r>
+                <a:r>
+                  <a:rPr lang="en-US" dirty="0"/>
+                  <a:t> </a:t>
+                </a:r>
+                <a:r>
+                  <a:rPr lang="en-US" dirty="0" err="1"/>
+                  <a:t>csak</a:t>
+                </a:r>
+                <a:r>
+                  <a:rPr lang="en-US" dirty="0"/>
+                  <a:t> </a:t>
+                </a:r>
+                <a14:m>
+                  <m:oMath xmlns:m="http://schemas.openxmlformats.org/officeDocument/2006/math">
+                    <m:r>
+                      <a:rPr lang="en-US" b="0" i="1" smtClean="0">
+                        <a:latin typeface="Cambria Math" panose="02040503050406030204" pitchFamily="18" charset="0"/>
+                      </a:rPr>
+                      <m:t>𝑓</m:t>
+                    </m:r>
+                    <m:r>
+                      <a:rPr lang="en-US" b="0" i="1" smtClean="0">
+                        <a:latin typeface="Cambria Math" panose="02040503050406030204" pitchFamily="18" charset="0"/>
+                      </a:rPr>
+                      <m:t>(</m:t>
+                    </m:r>
+                    <m:r>
+                      <a:rPr lang="en-US" b="0" i="1" smtClean="0">
+                        <a:latin typeface="Cambria Math" panose="02040503050406030204" pitchFamily="18" charset="0"/>
+                      </a:rPr>
+                      <m:t>𝑑</m:t>
+                    </m:r>
+                    <m:r>
+                      <a:rPr lang="en-US" b="0" i="1" smtClean="0">
+                        <a:latin typeface="Cambria Math" panose="02040503050406030204" pitchFamily="18" charset="0"/>
+                      </a:rPr>
+                      <m:t>,</m:t>
+                    </m:r>
+                    <m:r>
+                      <a:rPr lang="en-US" b="0" i="1" smtClean="0">
+                        <a:latin typeface="Cambria Math" panose="02040503050406030204" pitchFamily="18" charset="0"/>
+                      </a:rPr>
+                      <m:t>𝑧</m:t>
+                    </m:r>
+                    <m:r>
+                      <a:rPr lang="en-US" b="0" i="1" smtClean="0">
+                        <a:latin typeface="Cambria Math" panose="02040503050406030204" pitchFamily="18" charset="0"/>
+                      </a:rPr>
+                      <m:t>)</m:t>
+                    </m:r>
+                  </m:oMath>
+                </a14:m>
+                <a:r>
+                  <a:rPr lang="en-US" dirty="0"/>
+                  <a:t>-re </a:t>
+                </a:r>
+                <a:r>
+                  <a:rPr lang="en-US" dirty="0" err="1"/>
+                  <a:t>alkalmazhatsz</a:t>
+                </a:r>
+                <a:r>
+                  <a:rPr lang="en-US" dirty="0"/>
+                  <a:t>! (</a:t>
+                </a:r>
+                <a:r>
+                  <a:rPr lang="en-US" dirty="0" err="1"/>
+                  <a:t>tehát</a:t>
+                </a:r>
+                <a:r>
+                  <a:rPr lang="en-US" dirty="0"/>
+                  <a:t> </a:t>
+                </a:r>
+                <a:r>
+                  <a:rPr lang="en-US" dirty="0" err="1"/>
+                  <a:t>annyiszor</a:t>
+                </a:r>
+                <a:r>
+                  <a:rPr lang="en-US" dirty="0"/>
+                  <a:t> </a:t>
+                </a:r>
+                <a:r>
+                  <a:rPr lang="en-US" dirty="0" err="1"/>
+                  <a:t>kell</a:t>
+                </a:r>
+                <a:r>
+                  <a:rPr lang="en-US" dirty="0"/>
+                  <a:t> </a:t>
+                </a:r>
+                <a:r>
+                  <a:rPr lang="en-US" dirty="0" err="1"/>
+                  <a:t>kiértékelni</a:t>
+                </a:r>
+                <a:r>
+                  <a:rPr lang="en-US" dirty="0"/>
+                  <a:t>)</a:t>
+                </a:r>
+              </a:p>
+              <a:p>
+                <a:pPr>
+                  <a:buFont typeface="Wingdings" panose="05000000000000000000" pitchFamily="2" charset="2"/>
+                  <a:buChar char="§"/>
+                </a:pPr>
+                <a:endParaRPr lang="en-US" dirty="0"/>
+              </a:p>
+              <a:p>
+                <a:pPr>
+                  <a:buFont typeface="Wingdings" panose="05000000000000000000" pitchFamily="2" charset="2"/>
+                  <a:buChar char="§"/>
+                </a:pPr>
+                <a:r>
+                  <a:rPr lang="en-US" dirty="0" err="1"/>
+                  <a:t>Régen</a:t>
+                </a:r>
+                <a:r>
+                  <a:rPr lang="en-US" dirty="0"/>
+                  <a:t> </a:t>
+                </a:r>
+                <a:r>
+                  <a:rPr lang="en-US" dirty="0" err="1"/>
+                  <a:t>ez</a:t>
+                </a:r>
+                <a:r>
+                  <a:rPr lang="en-US" dirty="0"/>
+                  <a:t> </a:t>
+                </a:r>
+                <a:r>
+                  <a:rPr lang="en-US" dirty="0" err="1"/>
+                  <a:t>nagyon</a:t>
+                </a:r>
+                <a:r>
+                  <a:rPr lang="en-US" dirty="0"/>
+                  <a:t> </a:t>
+                </a:r>
+                <a:r>
+                  <a:rPr lang="en-US" dirty="0" err="1"/>
+                  <a:t>költséges</a:t>
+                </a:r>
+                <a:r>
+                  <a:rPr lang="en-US" dirty="0"/>
+                  <a:t> volt. Modern </a:t>
+                </a:r>
+                <a:r>
+                  <a:rPr lang="en-US" dirty="0" err="1"/>
+                  <a:t>hardvereken</a:t>
+                </a:r>
+                <a:r>
+                  <a:rPr lang="en-US" dirty="0"/>
+                  <a:t> </a:t>
+                </a:r>
+                <a:r>
+                  <a:rPr lang="en-US" dirty="0" err="1"/>
+                  <a:t>létezik</a:t>
+                </a:r>
+                <a:r>
+                  <a:rPr lang="en-US" dirty="0"/>
+                  <a:t> </a:t>
+                </a:r>
+                <a:r>
+                  <a:rPr lang="en-US" dirty="0" err="1"/>
+                  <a:t>az</a:t>
+                </a:r>
+                <a:r>
+                  <a:rPr lang="en-US" dirty="0"/>
+                  <a:t> </a:t>
+                </a:r>
+                <a:r>
+                  <a:rPr lang="en-US" dirty="0" err="1"/>
+                  <a:t>ún</a:t>
+                </a:r>
+                <a:r>
+                  <a:rPr lang="en-US" dirty="0"/>
+                  <a:t>. </a:t>
+                </a:r>
+                <a:r>
+                  <a:rPr lang="en-US" i="1" dirty="0"/>
+                  <a:t>texture pre-fetch cache</a:t>
+                </a:r>
+                <a:r>
+                  <a:rPr lang="en-US" dirty="0"/>
+                  <a:t>; </a:t>
+                </a:r>
+                <a:r>
+                  <a:rPr lang="en-US" dirty="0" err="1"/>
+                  <a:t>amíg</a:t>
+                </a:r>
+                <a:r>
+                  <a:rPr lang="en-US" dirty="0"/>
+                  <a:t> </a:t>
+                </a:r>
+                <a:r>
+                  <a:rPr lang="en-US" dirty="0" err="1"/>
+                  <a:t>ebből</a:t>
+                </a:r>
+                <a:r>
+                  <a:rPr lang="en-US" dirty="0"/>
+                  <a:t> </a:t>
+                </a:r>
+                <a:r>
+                  <a:rPr lang="en-US" dirty="0" err="1"/>
+                  <a:t>nem</a:t>
+                </a:r>
+                <a:r>
+                  <a:rPr lang="en-US" dirty="0"/>
+                  <a:t> </a:t>
+                </a:r>
+                <a:r>
+                  <a:rPr lang="en-US" dirty="0" err="1"/>
+                  <a:t>címzel</a:t>
+                </a:r>
+                <a:r>
+                  <a:rPr lang="en-US" dirty="0"/>
+                  <a:t> </a:t>
+                </a:r>
+                <a:r>
+                  <a:rPr lang="en-US" dirty="0" err="1"/>
+                  <a:t>ki</a:t>
+                </a:r>
+                <a:r>
+                  <a:rPr lang="en-US" dirty="0"/>
+                  <a:t>, </a:t>
+                </a:r>
+                <a:r>
+                  <a:rPr lang="en-US" dirty="0" err="1"/>
+                  <a:t>addig</a:t>
+                </a:r>
+                <a:r>
+                  <a:rPr lang="en-US" dirty="0"/>
+                  <a:t> a </a:t>
+                </a:r>
+                <a:r>
+                  <a:rPr lang="en-US" dirty="0" err="1"/>
+                  <a:t>textúra</a:t>
+                </a:r>
+                <a:r>
+                  <a:rPr lang="en-US" dirty="0"/>
+                  <a:t> </a:t>
+                </a:r>
+                <a:r>
+                  <a:rPr lang="en-US" dirty="0" err="1"/>
+                  <a:t>olvasások</a:t>
+                </a:r>
+                <a:r>
+                  <a:rPr lang="en-US" dirty="0"/>
+                  <a:t> </a:t>
+                </a:r>
+                <a:r>
+                  <a:rPr lang="en-US" dirty="0" err="1"/>
+                  <a:t>gyorsak</a:t>
+                </a:r>
+                <a:r>
+                  <a:rPr lang="en-US" dirty="0"/>
+                  <a:t> (</a:t>
+                </a:r>
+                <a:r>
+                  <a:rPr lang="en-US" dirty="0" err="1"/>
+                  <a:t>akár</a:t>
+                </a:r>
+                <a:r>
+                  <a:rPr lang="en-US" dirty="0"/>
+                  <a:t> 8x8-ig is </a:t>
+                </a:r>
+                <a:r>
+                  <a:rPr lang="en-US" dirty="0" err="1"/>
+                  <a:t>elmehetsz</a:t>
+                </a:r>
+                <a:r>
+                  <a:rPr lang="en-US" dirty="0"/>
+                  <a:t>)</a:t>
+                </a:r>
+              </a:p>
+              <a:p>
+                <a:pPr>
+                  <a:buFont typeface="Wingdings" panose="05000000000000000000" pitchFamily="2" charset="2"/>
+                  <a:buChar char="§"/>
+                </a:pPr>
+                <a:endParaRPr lang="en-US" dirty="0"/>
+              </a:p>
+              <a:p>
+                <a:pPr>
+                  <a:buFont typeface="Wingdings" panose="05000000000000000000" pitchFamily="2" charset="2"/>
+                  <a:buChar char="§"/>
+                </a:pPr>
+                <a:r>
+                  <a:rPr lang="en-US" dirty="0"/>
+                  <a:t>De </a:t>
+                </a:r>
+                <a:r>
+                  <a:rPr lang="en-US" dirty="0" err="1"/>
+                  <a:t>sajnos</a:t>
+                </a:r>
+                <a:r>
+                  <a:rPr lang="en-US" dirty="0"/>
+                  <a:t> a </a:t>
+                </a:r>
+                <a:r>
+                  <a:rPr lang="en-US" dirty="0" err="1"/>
+                  <a:t>jelenet</a:t>
+                </a:r>
+                <a:r>
+                  <a:rPr lang="en-US" dirty="0"/>
+                  <a:t> </a:t>
+                </a:r>
+                <a:r>
+                  <a:rPr lang="en-US" dirty="0" err="1"/>
+                  <a:t>mérete</a:t>
+                </a:r>
+                <a:r>
+                  <a:rPr lang="en-US" dirty="0"/>
+                  <a:t> </a:t>
+                </a:r>
+                <a:r>
+                  <a:rPr lang="en-US" dirty="0" err="1"/>
+                  <a:t>befolyásolja</a:t>
+                </a:r>
+                <a:r>
+                  <a:rPr lang="en-US" dirty="0"/>
+                  <a:t> a </a:t>
+                </a:r>
+                <a:r>
+                  <a:rPr lang="en-US" dirty="0" err="1"/>
+                  <a:t>minőséget</a:t>
+                </a:r>
+                <a:r>
+                  <a:rPr lang="en-US" dirty="0"/>
+                  <a:t>…</a:t>
+                </a:r>
+                <a:r>
+                  <a:rPr lang="en-US" dirty="0" err="1"/>
+                  <a:t>tipikusan</a:t>
+                </a:r>
+                <a:r>
+                  <a:rPr lang="en-US" dirty="0"/>
+                  <a:t> </a:t>
+                </a:r>
+                <a:r>
+                  <a:rPr lang="en-US" i="1" dirty="0"/>
+                  <a:t>open environment</a:t>
+                </a:r>
+                <a:r>
+                  <a:rPr lang="en-US" dirty="0"/>
+                  <a:t> </a:t>
+                </a:r>
+                <a:r>
+                  <a:rPr lang="en-US" dirty="0" err="1"/>
+                  <a:t>játékokban</a:t>
+                </a:r>
+                <a:r>
+                  <a:rPr lang="en-US" dirty="0"/>
+                  <a:t>, mint a </a:t>
+                </a:r>
+                <a:r>
+                  <a:rPr lang="en-US" i="1" dirty="0" err="1"/>
+                  <a:t>Crysis</a:t>
+                </a:r>
+                <a:r>
+                  <a:rPr lang="en-US" dirty="0"/>
+                  <a:t> (2007)</a:t>
+                </a:r>
+                <a:endParaRPr lang="hu-HU" dirty="0"/>
+              </a:p>
+            </p:txBody>
+          </p:sp>
+        </mc:Choice>
+        <mc:Fallback>
+          <p:sp>
+            <p:nvSpPr>
+              <p:cNvPr id="3" name="Content Placeholder 2">
+                <a:extLst>
+                  <a:ext uri="{FF2B5EF4-FFF2-40B4-BE49-F238E27FC236}">
+                    <a16:creationId xmlns:a16="http://schemas.microsoft.com/office/drawing/2014/main" id="{C5EF5C0D-0210-4F7A-BDF4-51996D18264C}"/>
+                  </a:ext>
+                </a:extLst>
+              </p:cNvPr>
+              <p:cNvSpPr>
+                <a:spLocks noGrp="1" noRot="1" noChangeAspect="1" noMove="1" noResize="1" noEditPoints="1" noAdjustHandles="1" noChangeArrowheads="1" noChangeShapeType="1" noTextEdit="1"/>
+              </p:cNvSpPr>
+              <p:nvPr>
+                <p:ph idx="1"/>
+              </p:nvPr>
+            </p:nvSpPr>
+            <p:spPr>
+              <a:blipFill>
+                <a:blip r:embed="rId2"/>
+                <a:stretch>
+                  <a:fillRect l="-1455" t="-1667" r="-1515"/>
+                </a:stretch>
+              </a:blipFill>
+            </p:spPr>
+            <p:txBody>
+              <a:bodyPr/>
+              <a:lstStyle/>
+              <a:p>
+                <a:r>
+                  <a:rPr lang="hu-HU">
+                    <a:noFill/>
+                  </a:rPr>
+                  <a:t> </a:t>
+                </a:r>
+              </a:p>
+            </p:txBody>
+          </p:sp>
+        </mc:Fallback>
+      </mc:AlternateContent>
+    </p:spTree>
+    <p:extLst>
+      <p:ext uri="{BB962C8B-B14F-4D97-AF65-F5344CB8AC3E}">
+        <p14:creationId xmlns:p14="http://schemas.microsoft.com/office/powerpoint/2010/main" val="384341522"/>
       </p:ext>
     </p:extLst>
   </p:cSld>

</xml_diff>